<commit_message>
modified images: drawing the installer to each components
</commit_message>
<xml_diff>
--- a/artifactory-pro/image/my-skilling-artifactory-pro-overview.pptx
+++ b/artifactory-pro/image/my-skilling-artifactory-pro-overview.pptx
@@ -119,7 +119,7 @@
           </a:lstStyle>
           <a:p>
             <a:fld id="{B6D08C24-C375-234A-A713-0D1EEABB99F2}" type="datetimeFigureOut">
-              <a:t>2026/1/18</a:t>
+              <a:t>2026/1/19</a:t>
             </a:fld>
             <a:endParaRPr kumimoji="1" lang="ja-JP" altLang="en-US"/>
           </a:p>
@@ -3049,6 +3049,168 @@
           </a:p>
         </p:txBody>
       </p:sp>
+      <p:pic>
+        <p:nvPicPr>
+          <p:cNvPr id="8" name="図 7" descr="アイコン&#10;&#10;AI 生成コンテンツは誤りを含む可能性があります。">
+            <a:extLst>
+              <a:ext uri="{FF2B5EF4-FFF2-40B4-BE49-F238E27FC236}">
+                <a16:creationId xmlns:a16="http://schemas.microsoft.com/office/drawing/2014/main" id="{F923A9D9-EAEF-6903-536A-EADF931C03A9}"/>
+              </a:ext>
+            </a:extLst>
+          </p:cNvPr>
+          <p:cNvPicPr>
+            <a:picLocks noChangeAspect="1"/>
+          </p:cNvPicPr>
+          <p:nvPr/>
+        </p:nvPicPr>
+        <p:blipFill>
+          <a:blip r:embed="rId7" cstate="print">
+            <a:extLst>
+              <a:ext uri="{28A0092B-C50C-407E-A947-70E740481C1C}">
+                <a14:useLocalDpi xmlns:a14="http://schemas.microsoft.com/office/drawing/2010/main" val="0"/>
+              </a:ext>
+            </a:extLst>
+          </a:blip>
+          <a:stretch>
+            <a:fillRect/>
+          </a:stretch>
+        </p:blipFill>
+        <p:spPr>
+          <a:xfrm>
+            <a:off x="2309050" y="2931837"/>
+            <a:ext cx="556148" cy="540000"/>
+          </a:xfrm>
+          <a:prstGeom prst="rect">
+            <a:avLst/>
+          </a:prstGeom>
+        </p:spPr>
+      </p:pic>
+      <p:sp>
+        <p:nvSpPr>
+          <p:cNvPr id="9" name="テキスト ボックス 8">
+            <a:extLst>
+              <a:ext uri="{FF2B5EF4-FFF2-40B4-BE49-F238E27FC236}">
+                <a16:creationId xmlns:a16="http://schemas.microsoft.com/office/drawing/2014/main" id="{9CBEA150-63AE-E2CD-A627-91786A3EF3B0}"/>
+              </a:ext>
+            </a:extLst>
+          </p:cNvPr>
+          <p:cNvSpPr txBox="1"/>
+          <p:nvPr/>
+        </p:nvSpPr>
+        <p:spPr>
+          <a:xfrm>
+            <a:off x="2047124" y="3537389"/>
+            <a:ext cx="1080000" cy="216000"/>
+          </a:xfrm>
+          <a:prstGeom prst="rect">
+            <a:avLst/>
+          </a:prstGeom>
+          <a:noFill/>
+        </p:spPr>
+        <p:txBody>
+          <a:bodyPr wrap="none" lIns="0" tIns="0" rIns="0" bIns="0" rtlCol="0" anchor="ctr" anchorCtr="0">
+            <a:noAutofit/>
+          </a:bodyPr>
+          <a:lstStyle/>
+          <a:p>
+            <a:pPr algn="ctr"/>
+            <a:r>
+              <a:rPr kumimoji="1" lang="en-US" altLang="ja-JP" sz="1200" b="1" dirty="0">
+                <a:latin typeface="メイリオ" panose="020B0604030504040204" pitchFamily="50" charset="-128"/>
+                <a:ea typeface="メイリオ" panose="020B0604030504040204" pitchFamily="50" charset="-128"/>
+              </a:rPr>
+              <a:t>Shell Script</a:t>
+            </a:r>
+            <a:endParaRPr kumimoji="1" lang="ja-JP" altLang="en-US" sz="1400" b="1" dirty="0">
+              <a:latin typeface="メイリオ" panose="020B0604030504040204" pitchFamily="50" charset="-128"/>
+              <a:ea typeface="メイリオ" panose="020B0604030504040204" pitchFamily="50" charset="-128"/>
+            </a:endParaRPr>
+          </a:p>
+        </p:txBody>
+      </p:sp>
+      <p:sp>
+        <p:nvSpPr>
+          <p:cNvPr id="10" name="矢印: 右 9">
+            <a:extLst>
+              <a:ext uri="{FF2B5EF4-FFF2-40B4-BE49-F238E27FC236}">
+                <a16:creationId xmlns:a16="http://schemas.microsoft.com/office/drawing/2014/main" id="{DE8B918F-37ED-1E51-5C7F-24BE74954374}"/>
+              </a:ext>
+            </a:extLst>
+          </p:cNvPr>
+          <p:cNvSpPr/>
+          <p:nvPr/>
+        </p:nvSpPr>
+        <p:spPr>
+          <a:xfrm>
+            <a:off x="2272305" y="3524287"/>
+            <a:ext cx="1368000" cy="1044000"/>
+          </a:xfrm>
+          <a:prstGeom prst="rightArrow">
+            <a:avLst/>
+          </a:prstGeom>
+          <a:solidFill>
+            <a:schemeClr val="bg1"/>
+          </a:solidFill>
+          <a:ln w="12700">
+            <a:solidFill>
+              <a:schemeClr val="tx1"/>
+            </a:solidFill>
+          </a:ln>
+        </p:spPr>
+        <p:style>
+          <a:lnRef idx="2">
+            <a:schemeClr val="accent1">
+              <a:shade val="15000"/>
+            </a:schemeClr>
+          </a:lnRef>
+          <a:fillRef idx="1">
+            <a:schemeClr val="accent1"/>
+          </a:fillRef>
+          <a:effectRef idx="0">
+            <a:schemeClr val="accent1"/>
+          </a:effectRef>
+          <a:fontRef idx="minor">
+            <a:schemeClr val="lt1"/>
+          </a:fontRef>
+        </p:style>
+        <p:txBody>
+          <a:bodyPr rtlCol="0" anchor="ctr"/>
+          <a:lstStyle/>
+          <a:p>
+            <a:pPr algn="ctr"/>
+            <a:r>
+              <a:rPr kumimoji="1" lang="en-US" altLang="ja-JP" sz="1400" b="1" dirty="0">
+                <a:solidFill>
+                  <a:schemeClr val="tx1"/>
+                </a:solidFill>
+                <a:latin typeface="メイリオ" panose="020B0604030504040204" pitchFamily="50" charset="-128"/>
+                <a:ea typeface="メイリオ" panose="020B0604030504040204" pitchFamily="50" charset="-128"/>
+              </a:rPr>
+              <a:t>Install</a:t>
+            </a:r>
+          </a:p>
+          <a:p>
+            <a:pPr algn="ctr"/>
+            <a:r>
+              <a:rPr kumimoji="1" lang="en-US" altLang="ja-JP" sz="1400" b="1" dirty="0">
+                <a:solidFill>
+                  <a:schemeClr val="tx1"/>
+                </a:solidFill>
+                <a:latin typeface="メイリオ" panose="020B0604030504040204" pitchFamily="50" charset="-128"/>
+                <a:ea typeface="メイリオ" panose="020B0604030504040204" pitchFamily="50" charset="-128"/>
+              </a:rPr>
+              <a:t>Uninstall</a:t>
+            </a:r>
+            <a:endParaRPr kumimoji="1" lang="ja-JP" altLang="en-US" sz="1400" b="1" dirty="0">
+              <a:solidFill>
+                <a:schemeClr val="tx1"/>
+              </a:solidFill>
+              <a:latin typeface="メイリオ" panose="020B0604030504040204" pitchFamily="50" charset="-128"/>
+              <a:ea typeface="メイリオ" panose="020B0604030504040204" pitchFamily="50" charset="-128"/>
+            </a:endParaRPr>
+          </a:p>
+        </p:txBody>
+      </p:sp>
     </p:spTree>
     <p:extLst>
       <p:ext uri="{BB962C8B-B14F-4D97-AF65-F5344CB8AC3E}">
@@ -4798,6 +4960,214 @@
           </a:p>
         </p:txBody>
       </p:sp>
+      <p:pic>
+        <p:nvPicPr>
+          <p:cNvPr id="2" name="図 1" descr="アイコン&#10;&#10;AI 生成コンテンツは誤りを含む可能性があります。">
+            <a:extLst>
+              <a:ext uri="{FF2B5EF4-FFF2-40B4-BE49-F238E27FC236}">
+                <a16:creationId xmlns:a16="http://schemas.microsoft.com/office/drawing/2014/main" id="{0389D52E-1322-16CA-5734-93F7E05CF589}"/>
+              </a:ext>
+            </a:extLst>
+          </p:cNvPr>
+          <p:cNvPicPr>
+            <a:picLocks noChangeAspect="1"/>
+          </p:cNvPicPr>
+          <p:nvPr/>
+        </p:nvPicPr>
+        <p:blipFill>
+          <a:blip r:embed="rId8" cstate="print">
+            <a:extLst>
+              <a:ext uri="{28A0092B-C50C-407E-A947-70E740481C1C}">
+                <a14:useLocalDpi xmlns:a14="http://schemas.microsoft.com/office/drawing/2010/main" val="0"/>
+              </a:ext>
+            </a:extLst>
+          </a:blip>
+          <a:stretch>
+            <a:fillRect/>
+          </a:stretch>
+        </p:blipFill>
+        <p:spPr>
+          <a:xfrm>
+            <a:off x="380007" y="4264987"/>
+            <a:ext cx="556148" cy="540000"/>
+          </a:xfrm>
+          <a:prstGeom prst="rect">
+            <a:avLst/>
+          </a:prstGeom>
+        </p:spPr>
+      </p:pic>
+      <p:sp>
+        <p:nvSpPr>
+          <p:cNvPr id="5" name="テキスト ボックス 4">
+            <a:extLst>
+              <a:ext uri="{FF2B5EF4-FFF2-40B4-BE49-F238E27FC236}">
+                <a16:creationId xmlns:a16="http://schemas.microsoft.com/office/drawing/2014/main" id="{D36B98DF-9047-8CF9-287A-788C9BCFB078}"/>
+              </a:ext>
+            </a:extLst>
+          </p:cNvPr>
+          <p:cNvSpPr txBox="1"/>
+          <p:nvPr/>
+        </p:nvSpPr>
+        <p:spPr>
+          <a:xfrm>
+            <a:off x="118081" y="4905277"/>
+            <a:ext cx="1080000" cy="216000"/>
+          </a:xfrm>
+          <a:prstGeom prst="rect">
+            <a:avLst/>
+          </a:prstGeom>
+          <a:noFill/>
+        </p:spPr>
+        <p:txBody>
+          <a:bodyPr wrap="none" lIns="0" tIns="0" rIns="0" bIns="0" rtlCol="0" anchor="ctr" anchorCtr="0">
+            <a:noAutofit/>
+          </a:bodyPr>
+          <a:lstStyle/>
+          <a:p>
+            <a:pPr algn="ctr"/>
+            <a:r>
+              <a:rPr kumimoji="1" lang="en-US" altLang="ja-JP" sz="1200" b="1" dirty="0">
+                <a:latin typeface="メイリオ" panose="020B0604030504040204" pitchFamily="50" charset="-128"/>
+                <a:ea typeface="メイリオ" panose="020B0604030504040204" pitchFamily="50" charset="-128"/>
+              </a:rPr>
+              <a:t>Terraform</a:t>
+            </a:r>
+          </a:p>
+          <a:p>
+            <a:pPr algn="ctr"/>
+            <a:r>
+              <a:rPr kumimoji="1" lang="en-US" altLang="ja-JP" sz="1200" b="1" dirty="0">
+                <a:latin typeface="メイリオ" panose="020B0604030504040204" pitchFamily="50" charset="-128"/>
+                <a:ea typeface="メイリオ" panose="020B0604030504040204" pitchFamily="50" charset="-128"/>
+              </a:rPr>
+              <a:t>Ansible</a:t>
+            </a:r>
+            <a:endParaRPr kumimoji="1" lang="ja-JP" altLang="en-US" sz="1400" b="1" dirty="0">
+              <a:latin typeface="メイリオ" panose="020B0604030504040204" pitchFamily="50" charset="-128"/>
+              <a:ea typeface="メイリオ" panose="020B0604030504040204" pitchFamily="50" charset="-128"/>
+            </a:endParaRPr>
+          </a:p>
+        </p:txBody>
+      </p:sp>
+      <p:sp>
+        <p:nvSpPr>
+          <p:cNvPr id="6" name="矢印: 右 5">
+            <a:extLst>
+              <a:ext uri="{FF2B5EF4-FFF2-40B4-BE49-F238E27FC236}">
+                <a16:creationId xmlns:a16="http://schemas.microsoft.com/office/drawing/2014/main" id="{29E35529-D819-A8BB-B5E2-94E5D79F1B93}"/>
+              </a:ext>
+            </a:extLst>
+          </p:cNvPr>
+          <p:cNvSpPr/>
+          <p:nvPr/>
+        </p:nvSpPr>
+        <p:spPr>
+          <a:xfrm>
+            <a:off x="1131809" y="4738638"/>
+            <a:ext cx="1368000" cy="1044000"/>
+          </a:xfrm>
+          <a:prstGeom prst="rightArrow">
+            <a:avLst/>
+          </a:prstGeom>
+          <a:solidFill>
+            <a:schemeClr val="bg1"/>
+          </a:solidFill>
+          <a:ln w="12700">
+            <a:solidFill>
+              <a:schemeClr val="tx1"/>
+            </a:solidFill>
+          </a:ln>
+        </p:spPr>
+        <p:style>
+          <a:lnRef idx="2">
+            <a:schemeClr val="accent1">
+              <a:shade val="15000"/>
+            </a:schemeClr>
+          </a:lnRef>
+          <a:fillRef idx="1">
+            <a:schemeClr val="accent1"/>
+          </a:fillRef>
+          <a:effectRef idx="0">
+            <a:schemeClr val="accent1"/>
+          </a:effectRef>
+          <a:fontRef idx="minor">
+            <a:schemeClr val="lt1"/>
+          </a:fontRef>
+        </p:style>
+        <p:txBody>
+          <a:bodyPr rtlCol="0" anchor="ctr"/>
+          <a:lstStyle/>
+          <a:p>
+            <a:pPr algn="ctr"/>
+            <a:r>
+              <a:rPr kumimoji="1" lang="en-US" altLang="ja-JP" sz="1400" b="1" dirty="0">
+                <a:solidFill>
+                  <a:schemeClr val="tx1"/>
+                </a:solidFill>
+                <a:latin typeface="メイリオ" panose="020B0604030504040204" pitchFamily="50" charset="-128"/>
+                <a:ea typeface="メイリオ" panose="020B0604030504040204" pitchFamily="50" charset="-128"/>
+              </a:rPr>
+              <a:t>Install</a:t>
+            </a:r>
+          </a:p>
+          <a:p>
+            <a:pPr algn="ctr"/>
+            <a:r>
+              <a:rPr kumimoji="1" lang="en-US" altLang="ja-JP" sz="1400" b="1" dirty="0">
+                <a:solidFill>
+                  <a:schemeClr val="tx1"/>
+                </a:solidFill>
+                <a:latin typeface="メイリオ" panose="020B0604030504040204" pitchFamily="50" charset="-128"/>
+                <a:ea typeface="メイリオ" panose="020B0604030504040204" pitchFamily="50" charset="-128"/>
+              </a:rPr>
+              <a:t>Uninstall</a:t>
+            </a:r>
+            <a:endParaRPr kumimoji="1" lang="ja-JP" altLang="en-US" sz="1400" b="1" dirty="0">
+              <a:solidFill>
+                <a:schemeClr val="tx1"/>
+              </a:solidFill>
+              <a:latin typeface="メイリオ" panose="020B0604030504040204" pitchFamily="50" charset="-128"/>
+              <a:ea typeface="メイリオ" panose="020B0604030504040204" pitchFamily="50" charset="-128"/>
+            </a:endParaRPr>
+          </a:p>
+        </p:txBody>
+      </p:sp>
+      <p:pic>
+        <p:nvPicPr>
+          <p:cNvPr id="10" name="図 9" descr="モニター画面に映る文字&#10;&#10;AI 生成コンテンツは誤りを含む可能性があります。">
+            <a:extLst>
+              <a:ext uri="{FF2B5EF4-FFF2-40B4-BE49-F238E27FC236}">
+                <a16:creationId xmlns:a16="http://schemas.microsoft.com/office/drawing/2014/main" id="{771BC019-E39E-74C5-C22D-AE037EECA251}"/>
+              </a:ext>
+            </a:extLst>
+          </p:cNvPr>
+          <p:cNvPicPr>
+            <a:picLocks noChangeAspect="1"/>
+          </p:cNvPicPr>
+          <p:nvPr/>
+        </p:nvPicPr>
+        <p:blipFill>
+          <a:blip r:embed="rId9" cstate="print">
+            <a:extLst>
+              <a:ext uri="{28A0092B-C50C-407E-A947-70E740481C1C}">
+                <a14:useLocalDpi xmlns:a14="http://schemas.microsoft.com/office/drawing/2010/main" val="0"/>
+              </a:ext>
+            </a:extLst>
+          </a:blip>
+          <a:stretch>
+            <a:fillRect/>
+          </a:stretch>
+        </p:blipFill>
+        <p:spPr>
+          <a:xfrm>
+            <a:off x="160298" y="5098029"/>
+            <a:ext cx="936000" cy="936000"/>
+          </a:xfrm>
+          <a:prstGeom prst="rect">
+            <a:avLst/>
+          </a:prstGeom>
+        </p:spPr>
+      </p:pic>
     </p:spTree>
     <p:extLst>
       <p:ext uri="{BB962C8B-B14F-4D97-AF65-F5344CB8AC3E}">

</xml_diff>

<commit_message>
updated the diagram to write a number of port on lb
</commit_message>
<xml_diff>
--- a/artifactory-pro/image/my-skilling-artifactory-pro-overview.pptx
+++ b/artifactory-pro/image/my-skilling-artifactory-pro-overview.pptx
@@ -5168,6 +5168,49 @@
           </a:prstGeom>
         </p:spPr>
       </p:pic>
+      <p:sp>
+        <p:nvSpPr>
+          <p:cNvPr id="9" name="テキスト ボックス 8">
+            <a:extLst>
+              <a:ext uri="{FF2B5EF4-FFF2-40B4-BE49-F238E27FC236}">
+                <a16:creationId xmlns:a16="http://schemas.microsoft.com/office/drawing/2014/main" id="{F9E5ABE6-BB86-844E-4ADB-6CF68264087B}"/>
+              </a:ext>
+            </a:extLst>
+          </p:cNvPr>
+          <p:cNvSpPr txBox="1"/>
+          <p:nvPr/>
+        </p:nvSpPr>
+        <p:spPr>
+          <a:xfrm>
+            <a:off x="6064808" y="1622098"/>
+            <a:ext cx="1080000" cy="216000"/>
+          </a:xfrm>
+          <a:prstGeom prst="rect">
+            <a:avLst/>
+          </a:prstGeom>
+          <a:noFill/>
+        </p:spPr>
+        <p:txBody>
+          <a:bodyPr wrap="none" lIns="0" tIns="0" rIns="0" bIns="0" rtlCol="0" anchor="ctr" anchorCtr="0">
+            <a:noAutofit/>
+          </a:bodyPr>
+          <a:lstStyle/>
+          <a:p>
+            <a:pPr algn="ctr"/>
+            <a:r>
+              <a:rPr kumimoji="1" lang="en-US" altLang="ja-JP" sz="1050" dirty="0">
+                <a:latin typeface="メイリオ" panose="020B0604030504040204" pitchFamily="50" charset="-128"/>
+                <a:ea typeface="メイリオ" panose="020B0604030504040204" pitchFamily="50" charset="-128"/>
+              </a:rPr>
+              <a:t>HTTP(80)</a:t>
+            </a:r>
+            <a:endParaRPr kumimoji="1" lang="ja-JP" altLang="en-US" sz="1100" dirty="0">
+              <a:latin typeface="メイリオ" panose="020B0604030504040204" pitchFamily="50" charset="-128"/>
+              <a:ea typeface="メイリオ" panose="020B0604030504040204" pitchFamily="50" charset="-128"/>
+            </a:endParaRPr>
+          </a:p>
+        </p:txBody>
+      </p:sp>
     </p:spTree>
     <p:extLst>
       <p:ext uri="{BB962C8B-B14F-4D97-AF65-F5344CB8AC3E}">

</xml_diff>